<commit_message>
more modifications for CSSCR
</commit_message>
<xml_diff>
--- a/Poster/GW Glitch UW poster MODIFIED.pptx
+++ b/Poster/GW Glitch UW poster MODIFIED.pptx
@@ -3793,8 +3793,8 @@
         </p:nvSpPr>
         <p:spPr>
           <a:xfrm>
-            <a:off x="7772400" y="7315200"/>
-            <a:ext cx="6400800" cy="7223760"/>
+            <a:off x="8321040" y="7315200"/>
+            <a:ext cx="5303520" cy="548640"/>
           </a:xfrm>
           <a:prstGeom prst="rect">
             <a:avLst/>
@@ -3833,8 +3833,8 @@
         </p:nvSpPr>
         <p:spPr>
           <a:xfrm>
-            <a:off x="7955280" y="7406640"/>
-            <a:ext cx="6035040" cy="6924973"/>
+            <a:off x="7955280" y="7315200"/>
+            <a:ext cx="6035040" cy="7017306"/>
           </a:xfrm>
           <a:prstGeom prst="rect">
             <a:avLst/>
@@ -3846,6 +3846,24 @@
             <a:spAutoFit/>
           </a:bodyPr>
           <a:lstStyle/>
+          <a:p>
+            <a:pPr algn="ctr">
+              <a:spcAft>
+                <a:spcPts val="1200"/>
+              </a:spcAft>
+            </a:pPr>
+            <a:r>
+              <a:rPr lang="en-US" sz="2800" b="1" dirty="0">
+                <a:solidFill>
+                  <a:srgbClr val="E8D3A2"/>
+                </a:solidFill>
+                <a:latin typeface="Encode Sans Normal Black" charset="0"/>
+                <a:ea typeface="Encode Sans Normal Black" charset="0"/>
+                <a:cs typeface="Encode Sans Normal Black" charset="0"/>
+              </a:rPr>
+              <a:t>Quick Facts About Our CNN</a:t>
+            </a:r>
+          </a:p>
           <a:p>
             <a:pPr>
               <a:spcAft>
@@ -3853,15 +3871,48 @@
               </a:spcAft>
             </a:pPr>
             <a:r>
-              <a:rPr lang="en-US" sz="2400" b="1" dirty="0">
-                <a:solidFill>
-                  <a:srgbClr val="E8D3A2"/>
-                </a:solidFill>
-                <a:latin typeface="Encode Sans Normal Black" charset="0"/>
-                <a:ea typeface="Encode Sans Normal Black" charset="0"/>
-                <a:cs typeface="Encode Sans Normal Black" charset="0"/>
-              </a:rPr>
-              <a:t>Quick Facts About Our CNN</a:t>
+              <a:rPr lang="en-US" sz="2200" b="1" dirty="0">
+                <a:solidFill>
+                  <a:srgbClr val="917B4C"/>
+                </a:solidFill>
+                <a:latin typeface="Open Sans" panose="020B0606030504020204" pitchFamily="34" charset="0"/>
+                <a:ea typeface="Open Sans" panose="020B0606030504020204" pitchFamily="34" charset="0"/>
+                <a:cs typeface="Open Sans" panose="020B0606030504020204" pitchFamily="34" charset="0"/>
+              </a:rPr>
+              <a:t>&gt;</a:t>
+            </a:r>
+            <a:r>
+              <a:rPr lang="en-US" sz="2200" dirty="0">
+                <a:solidFill>
+                  <a:srgbClr val="FFFFFF"/>
+                </a:solidFill>
+                <a:latin typeface="Open Sans" panose="020B0606030504020204" pitchFamily="34" charset="0"/>
+                <a:ea typeface="Open Sans" panose="020B0606030504020204" pitchFamily="34" charset="0"/>
+                <a:cs typeface="Open Sans" panose="020B0606030504020204" pitchFamily="34" charset="0"/>
+              </a:rPr>
+              <a:t> </a:t>
+            </a:r>
+            <a:r>
+              <a:rPr lang="en-US" sz="2200" b="1" dirty="0">
+                <a:solidFill>
+                  <a:srgbClr val="33006F"/>
+                </a:solidFill>
+                <a:latin typeface="Open Sans" panose="020B0606030504020204" pitchFamily="34" charset="0"/>
+                <a:ea typeface="Open Sans" panose="020B0606030504020204" pitchFamily="34" charset="0"/>
+                <a:cs typeface="Open Sans" panose="020B0606030504020204" pitchFamily="34" charset="0"/>
+              </a:rPr>
+              <a:t>~ 97% </a:t>
+            </a:r>
+            <a:r>
+              <a:rPr lang="en-US" sz="2200" dirty="0">
+                <a:solidFill>
+                  <a:srgbClr val="33006F"/>
+                </a:solidFill>
+                <a:latin typeface="Open Sans" panose="020B0606030504020204" pitchFamily="34" charset="0"/>
+                <a:ea typeface="Open Sans" panose="020B0606030504020204" pitchFamily="34" charset="0"/>
+                <a:cs typeface="Open Sans" panose="020B0606030504020204" pitchFamily="34" charset="0"/>
+              </a:rPr>
+              <a:t>testing accuracy</a:t>
             </a:r>
           </a:p>
           <a:p>
@@ -3873,7 +3924,7 @@
             <a:r>
               <a:rPr lang="en-US" sz="2200" b="1" dirty="0">
                 <a:solidFill>
-                  <a:schemeClr val="bg1"/>
+                  <a:srgbClr val="917B4C"/>
                 </a:solidFill>
                 <a:latin typeface="Open Sans" panose="020B0606030504020204" pitchFamily="34" charset="0"/>
                 <a:ea typeface="Open Sans" panose="020B0606030504020204" pitchFamily="34" charset="0"/>
@@ -3884,7 +3935,7 @@
             <a:r>
               <a:rPr lang="en-US" sz="2200" dirty="0">
                 <a:solidFill>
-                  <a:srgbClr val="FFFFFF"/>
+                  <a:srgbClr val="917B4C"/>
                 </a:solidFill>
                 <a:latin typeface="Open Sans" panose="020B0606030504020204" pitchFamily="34" charset="0"/>
                 <a:ea typeface="Open Sans" panose="020B0606030504020204" pitchFamily="34" charset="0"/>
@@ -3893,26 +3944,81 @@
               <a:t> </a:t>
             </a:r>
             <a:r>
+              <a:rPr lang="en-US" sz="2200" dirty="0">
+                <a:solidFill>
+                  <a:srgbClr val="33006F"/>
+                </a:solidFill>
+                <a:latin typeface="Open Sans" panose="020B0606030504020204" pitchFamily="34" charset="0"/>
+                <a:ea typeface="Open Sans" panose="020B0606030504020204" pitchFamily="34" charset="0"/>
+                <a:cs typeface="Open Sans" panose="020B0606030504020204" pitchFamily="34" charset="0"/>
+              </a:rPr>
+              <a:t>Data split of </a:t>
+            </a:r>
+            <a:r>
               <a:rPr lang="en-US" sz="2200" b="1" dirty="0">
                 <a:solidFill>
-                  <a:srgbClr val="FFFFFF"/>
-                </a:solidFill>
-                <a:latin typeface="Open Sans" panose="020B0606030504020204" pitchFamily="34" charset="0"/>
-                <a:ea typeface="Open Sans" panose="020B0606030504020204" pitchFamily="34" charset="0"/>
-                <a:cs typeface="Open Sans" panose="020B0606030504020204" pitchFamily="34" charset="0"/>
-              </a:rPr>
-              <a:t>~ 97% </a:t>
+                  <a:srgbClr val="33006F"/>
+                </a:solidFill>
+                <a:latin typeface="Open Sans" panose="020B0606030504020204" pitchFamily="34" charset="0"/>
+                <a:ea typeface="Open Sans" panose="020B0606030504020204" pitchFamily="34" charset="0"/>
+                <a:cs typeface="Open Sans" panose="020B0606030504020204" pitchFamily="34" charset="0"/>
+              </a:rPr>
+              <a:t>70%</a:t>
             </a:r>
             <a:r>
               <a:rPr lang="en-US" sz="2200" dirty="0">
                 <a:solidFill>
-                  <a:srgbClr val="FFFFFF"/>
-                </a:solidFill>
-                <a:latin typeface="Open Sans" panose="020B0606030504020204" pitchFamily="34" charset="0"/>
-                <a:ea typeface="Open Sans" panose="020B0606030504020204" pitchFamily="34" charset="0"/>
-                <a:cs typeface="Open Sans" panose="020B0606030504020204" pitchFamily="34" charset="0"/>
-              </a:rPr>
-              <a:t>testing accuracy</a:t>
+                  <a:srgbClr val="33006F"/>
+                </a:solidFill>
+                <a:latin typeface="Open Sans" panose="020B0606030504020204" pitchFamily="34" charset="0"/>
+                <a:ea typeface="Open Sans" panose="020B0606030504020204" pitchFamily="34" charset="0"/>
+                <a:cs typeface="Open Sans" panose="020B0606030504020204" pitchFamily="34" charset="0"/>
+              </a:rPr>
+              <a:t> training, </a:t>
+            </a:r>
+            <a:r>
+              <a:rPr lang="en-US" sz="2200" b="1" dirty="0">
+                <a:solidFill>
+                  <a:srgbClr val="33006F"/>
+                </a:solidFill>
+                <a:latin typeface="Open Sans" panose="020B0606030504020204" pitchFamily="34" charset="0"/>
+                <a:ea typeface="Open Sans" panose="020B0606030504020204" pitchFamily="34" charset="0"/>
+                <a:cs typeface="Open Sans" panose="020B0606030504020204" pitchFamily="34" charset="0"/>
+              </a:rPr>
+              <a:t>15%</a:t>
+            </a:r>
+            <a:r>
+              <a:rPr lang="en-US" sz="2200" dirty="0">
+                <a:solidFill>
+                  <a:srgbClr val="33006F"/>
+                </a:solidFill>
+                <a:latin typeface="Open Sans" panose="020B0606030504020204" pitchFamily="34" charset="0"/>
+                <a:ea typeface="Open Sans" panose="020B0606030504020204" pitchFamily="34" charset="0"/>
+                <a:cs typeface="Open Sans" panose="020B0606030504020204" pitchFamily="34" charset="0"/>
+              </a:rPr>
+              <a:t> validation, and </a:t>
+            </a:r>
+            <a:r>
+              <a:rPr lang="en-US" sz="2200" b="1" dirty="0">
+                <a:solidFill>
+                  <a:srgbClr val="33006F"/>
+                </a:solidFill>
+                <a:latin typeface="Open Sans" panose="020B0606030504020204" pitchFamily="34" charset="0"/>
+                <a:ea typeface="Open Sans" panose="020B0606030504020204" pitchFamily="34" charset="0"/>
+                <a:cs typeface="Open Sans" panose="020B0606030504020204" pitchFamily="34" charset="0"/>
+              </a:rPr>
+              <a:t>15%</a:t>
+            </a:r>
+            <a:r>
+              <a:rPr lang="en-US" sz="2200" dirty="0">
+                <a:solidFill>
+                  <a:srgbClr val="33006F"/>
+                </a:solidFill>
+                <a:latin typeface="Open Sans" panose="020B0606030504020204" pitchFamily="34" charset="0"/>
+                <a:ea typeface="Open Sans" panose="020B0606030504020204" pitchFamily="34" charset="0"/>
+                <a:cs typeface="Open Sans" panose="020B0606030504020204" pitchFamily="34" charset="0"/>
+              </a:rPr>
+              <a:t> testing</a:t>
             </a:r>
           </a:p>
           <a:p>
@@ -3924,135 +4030,51 @@
             <a:r>
               <a:rPr lang="en-US" sz="2200" b="1" dirty="0">
                 <a:solidFill>
+                  <a:srgbClr val="917B4C"/>
+                </a:solidFill>
+                <a:latin typeface="Open Sans" panose="020B0606030504020204" pitchFamily="34" charset="0"/>
+                <a:ea typeface="Open Sans" panose="020B0606030504020204" pitchFamily="34" charset="0"/>
+                <a:cs typeface="Open Sans" panose="020B0606030504020204" pitchFamily="34" charset="0"/>
+              </a:rPr>
+              <a:t>&gt;</a:t>
+            </a:r>
+            <a:r>
+              <a:rPr lang="en-US" sz="2200" b="1" dirty="0">
+                <a:solidFill>
                   <a:schemeClr val="bg1"/>
                 </a:solidFill>
                 <a:latin typeface="Open Sans" panose="020B0606030504020204" pitchFamily="34" charset="0"/>
                 <a:ea typeface="Open Sans" panose="020B0606030504020204" pitchFamily="34" charset="0"/>
                 <a:cs typeface="Open Sans" panose="020B0606030504020204" pitchFamily="34" charset="0"/>
               </a:rPr>
-              <a:t>&gt;</a:t>
+              <a:t> </a:t>
             </a:r>
             <a:r>
               <a:rPr lang="en-US" sz="2200" dirty="0">
                 <a:solidFill>
-                  <a:srgbClr val="FFFFFF"/>
-                </a:solidFill>
-                <a:latin typeface="Open Sans" panose="020B0606030504020204" pitchFamily="34" charset="0"/>
-                <a:ea typeface="Open Sans" panose="020B0606030504020204" pitchFamily="34" charset="0"/>
-                <a:cs typeface="Open Sans" panose="020B0606030504020204" pitchFamily="34" charset="0"/>
-              </a:rPr>
-              <a:t> Data split of </a:t>
+                  <a:srgbClr val="33006F"/>
+                </a:solidFill>
+                <a:latin typeface="Open Sans" panose="020B0606030504020204" pitchFamily="34" charset="0"/>
+                <a:ea typeface="Open Sans" panose="020B0606030504020204" pitchFamily="34" charset="0"/>
+                <a:cs typeface="Open Sans" panose="020B0606030504020204" pitchFamily="34" charset="0"/>
+              </a:rPr>
+              <a:t>Dataset contains a total of </a:t>
             </a:r>
             <a:r>
               <a:rPr lang="en-US" sz="2200" b="1" dirty="0">
                 <a:solidFill>
-                  <a:srgbClr val="FFFFFF"/>
-                </a:solidFill>
-                <a:latin typeface="Open Sans" panose="020B0606030504020204" pitchFamily="34" charset="0"/>
-                <a:ea typeface="Open Sans" panose="020B0606030504020204" pitchFamily="34" charset="0"/>
-                <a:cs typeface="Open Sans" panose="020B0606030504020204" pitchFamily="34" charset="0"/>
-              </a:rPr>
-              <a:t>70%</a:t>
+                  <a:srgbClr val="33006F"/>
+                </a:solidFill>
+                <a:latin typeface="Open Sans" panose="020B0606030504020204" pitchFamily="34" charset="0"/>
+                <a:ea typeface="Open Sans" panose="020B0606030504020204" pitchFamily="34" charset="0"/>
+                <a:cs typeface="Open Sans" panose="020B0606030504020204" pitchFamily="34" charset="0"/>
+              </a:rPr>
+              <a:t>146045 </a:t>
             </a:r>
             <a:r>
               <a:rPr lang="en-US" sz="2200" dirty="0">
                 <a:solidFill>
-                  <a:srgbClr val="FFFFFF"/>
-                </a:solidFill>
-                <a:latin typeface="Open Sans" panose="020B0606030504020204" pitchFamily="34" charset="0"/>
-                <a:ea typeface="Open Sans" panose="020B0606030504020204" pitchFamily="34" charset="0"/>
-                <a:cs typeface="Open Sans" panose="020B0606030504020204" pitchFamily="34" charset="0"/>
-              </a:rPr>
-              <a:t> training, </a:t>
-            </a:r>
-            <a:r>
-              <a:rPr lang="en-US" sz="2200" b="1" dirty="0">
-                <a:solidFill>
-                  <a:srgbClr val="FFFFFF"/>
-                </a:solidFill>
-                <a:latin typeface="Open Sans" panose="020B0606030504020204" pitchFamily="34" charset="0"/>
-                <a:ea typeface="Open Sans" panose="020B0606030504020204" pitchFamily="34" charset="0"/>
-                <a:cs typeface="Open Sans" panose="020B0606030504020204" pitchFamily="34" charset="0"/>
-              </a:rPr>
-              <a:t>15%</a:t>
-            </a:r>
-            <a:r>
-              <a:rPr lang="en-US" sz="2200" dirty="0">
-                <a:solidFill>
-                  <a:srgbClr val="FFFFFF"/>
-                </a:solidFill>
-                <a:latin typeface="Open Sans" panose="020B0606030504020204" pitchFamily="34" charset="0"/>
-                <a:ea typeface="Open Sans" panose="020B0606030504020204" pitchFamily="34" charset="0"/>
-                <a:cs typeface="Open Sans" panose="020B0606030504020204" pitchFamily="34" charset="0"/>
-              </a:rPr>
-              <a:t> validation, and </a:t>
-            </a:r>
-            <a:r>
-              <a:rPr lang="en-US" sz="2200" b="1" dirty="0">
-                <a:solidFill>
-                  <a:srgbClr val="FFFFFF"/>
-                </a:solidFill>
-                <a:latin typeface="Open Sans" panose="020B0606030504020204" pitchFamily="34" charset="0"/>
-                <a:ea typeface="Open Sans" panose="020B0606030504020204" pitchFamily="34" charset="0"/>
-                <a:cs typeface="Open Sans" panose="020B0606030504020204" pitchFamily="34" charset="0"/>
-              </a:rPr>
-              <a:t>15%</a:t>
-            </a:r>
-            <a:r>
-              <a:rPr lang="en-US" sz="2200" dirty="0">
-                <a:solidFill>
-                  <a:srgbClr val="FFFFFF"/>
-                </a:solidFill>
-                <a:latin typeface="Open Sans" panose="020B0606030504020204" pitchFamily="34" charset="0"/>
-                <a:ea typeface="Open Sans" panose="020B0606030504020204" pitchFamily="34" charset="0"/>
-                <a:cs typeface="Open Sans" panose="020B0606030504020204" pitchFamily="34" charset="0"/>
-              </a:rPr>
-              <a:t> testing</a:t>
-            </a:r>
-          </a:p>
-          <a:p>
-            <a:pPr>
-              <a:spcAft>
-                <a:spcPts val="1200"/>
-              </a:spcAft>
-            </a:pPr>
-            <a:r>
-              <a:rPr lang="en-US" sz="2200" b="1" dirty="0">
-                <a:solidFill>
-                  <a:schemeClr val="bg1"/>
-                </a:solidFill>
-                <a:latin typeface="Open Sans" panose="020B0606030504020204" pitchFamily="34" charset="0"/>
-                <a:ea typeface="Open Sans" panose="020B0606030504020204" pitchFamily="34" charset="0"/>
-                <a:cs typeface="Open Sans" panose="020B0606030504020204" pitchFamily="34" charset="0"/>
-              </a:rPr>
-              <a:t>&gt; </a:t>
-            </a:r>
-            <a:r>
-              <a:rPr lang="en-US" sz="2200" dirty="0">
-                <a:solidFill>
-                  <a:srgbClr val="FFFFFF"/>
-                </a:solidFill>
-                <a:latin typeface="Open Sans" panose="020B0606030504020204" pitchFamily="34" charset="0"/>
-                <a:ea typeface="Open Sans" panose="020B0606030504020204" pitchFamily="34" charset="0"/>
-                <a:cs typeface="Open Sans" panose="020B0606030504020204" pitchFamily="34" charset="0"/>
-              </a:rPr>
-              <a:t>Dataset contains a total of </a:t>
-            </a:r>
-            <a:r>
-              <a:rPr lang="en-US" sz="2200" b="1" dirty="0">
-                <a:solidFill>
-                  <a:srgbClr val="FFFFFF"/>
-                </a:solidFill>
-                <a:latin typeface="Open Sans" panose="020B0606030504020204" pitchFamily="34" charset="0"/>
-                <a:ea typeface="Open Sans" panose="020B0606030504020204" pitchFamily="34" charset="0"/>
-                <a:cs typeface="Open Sans" panose="020B0606030504020204" pitchFamily="34" charset="0"/>
-              </a:rPr>
-              <a:t>146045 </a:t>
-            </a:r>
-            <a:r>
-              <a:rPr lang="en-US" sz="2200" dirty="0">
-                <a:solidFill>
-                  <a:srgbClr val="FFFFFF"/>
+                  <a:srgbClr val="33006F"/>
                 </a:solidFill>
                 <a:latin typeface="Open Sans" panose="020B0606030504020204" pitchFamily="34" charset="0"/>
                 <a:ea typeface="Open Sans" panose="020B0606030504020204" pitchFamily="34" charset="0"/>
@@ -4062,7 +4084,7 @@
             </a:r>
             <a:endParaRPr lang="en-US" sz="2200" b="0" dirty="0">
               <a:solidFill>
-                <a:srgbClr val="DBDEE1"/>
+                <a:srgbClr val="33006F"/>
               </a:solidFill>
               <a:effectLst/>
               <a:latin typeface="Open Sans" panose="020B0606030504020204" pitchFamily="34" charset="0"/>
@@ -4079,18 +4101,29 @@
             <a:r>
               <a:rPr lang="en-US" sz="2200" b="1" dirty="0">
                 <a:solidFill>
+                  <a:srgbClr val="917B4C"/>
+                </a:solidFill>
+                <a:latin typeface="Open Sans" panose="020B0606030504020204" pitchFamily="34" charset="0"/>
+                <a:ea typeface="Open Sans" panose="020B0606030504020204" pitchFamily="34" charset="0"/>
+                <a:cs typeface="Open Sans" panose="020B0606030504020204" pitchFamily="34" charset="0"/>
+              </a:rPr>
+              <a:t>&gt;</a:t>
+            </a:r>
+            <a:r>
+              <a:rPr lang="en-US" sz="2200" b="1" dirty="0">
+                <a:solidFill>
                   <a:schemeClr val="bg1"/>
                 </a:solidFill>
                 <a:latin typeface="Open Sans" panose="020B0606030504020204" pitchFamily="34" charset="0"/>
                 <a:ea typeface="Open Sans" panose="020B0606030504020204" pitchFamily="34" charset="0"/>
                 <a:cs typeface="Open Sans" panose="020B0606030504020204" pitchFamily="34" charset="0"/>
               </a:rPr>
-              <a:t>&gt; </a:t>
+              <a:t> </a:t>
             </a:r>
             <a:r>
               <a:rPr lang="en-US" sz="2200" dirty="0">
                 <a:solidFill>
-                  <a:srgbClr val="FFFFFF"/>
+                  <a:srgbClr val="33006F"/>
                 </a:solidFill>
                 <a:latin typeface="Open Sans" panose="020B0606030504020204" pitchFamily="34" charset="0"/>
                 <a:ea typeface="Open Sans" panose="020B0606030504020204" pitchFamily="34" charset="0"/>
@@ -4101,7 +4134,7 @@
             <a:r>
               <a:rPr lang="en-US" sz="2200" b="1" dirty="0">
                 <a:solidFill>
-                  <a:srgbClr val="FFFFFF"/>
+                  <a:srgbClr val="33006F"/>
                 </a:solidFill>
                 <a:latin typeface="Open Sans" panose="020B0606030504020204" pitchFamily="34" charset="0"/>
                 <a:ea typeface="Open Sans" panose="020B0606030504020204" pitchFamily="34" charset="0"/>
@@ -4112,7 +4145,7 @@
             <a:r>
               <a:rPr lang="en-US" sz="2200" dirty="0">
                 <a:solidFill>
-                  <a:srgbClr val="FFFFFF"/>
+                  <a:srgbClr val="33006F"/>
                 </a:solidFill>
                 <a:latin typeface="Open Sans" panose="020B0606030504020204" pitchFamily="34" charset="0"/>
                 <a:ea typeface="Open Sans" panose="020B0606030504020204" pitchFamily="34" charset="0"/>
@@ -4130,7 +4163,7 @@
             <a:r>
               <a:rPr lang="en-US" sz="2200" b="1" dirty="0">
                 <a:solidFill>
-                  <a:schemeClr val="bg1"/>
+                  <a:srgbClr val="917B4C"/>
                 </a:solidFill>
                 <a:latin typeface="Open Sans" panose="020B0606030504020204" pitchFamily="34" charset="0"/>
                 <a:ea typeface="Open Sans" panose="020B0606030504020204" pitchFamily="34" charset="0"/>
@@ -4147,12 +4180,23 @@
                 <a:ea typeface="Open Sans" panose="020B0606030504020204" pitchFamily="34" charset="0"/>
                 <a:cs typeface="Open Sans" panose="020B0606030504020204" pitchFamily="34" charset="0"/>
               </a:rPr>
-              <a:t> Neural network contains </a:t>
+              <a:t> </a:t>
+            </a:r>
+            <a:r>
+              <a:rPr lang="en-US" sz="2200" dirty="0">
+                <a:solidFill>
+                  <a:srgbClr val="33006F"/>
+                </a:solidFill>
+                <a:latin typeface="Open Sans" panose="020B0606030504020204" pitchFamily="34" charset="0"/>
+                <a:ea typeface="Open Sans" panose="020B0606030504020204" pitchFamily="34" charset="0"/>
+                <a:cs typeface="Open Sans" panose="020B0606030504020204" pitchFamily="34" charset="0"/>
+              </a:rPr>
+              <a:t>Neural network contains </a:t>
             </a:r>
             <a:r>
               <a:rPr lang="en-US" sz="2200" b="1" dirty="0">
                 <a:solidFill>
-                  <a:srgbClr val="FFFFFF"/>
+                  <a:srgbClr val="33006F"/>
                 </a:solidFill>
                 <a:latin typeface="Open Sans" panose="020B0606030504020204" pitchFamily="34" charset="0"/>
                 <a:ea typeface="Open Sans" panose="020B0606030504020204" pitchFamily="34" charset="0"/>
@@ -4163,7 +4207,7 @@
             <a:r>
               <a:rPr lang="en-US" sz="2200" dirty="0">
                 <a:solidFill>
-                  <a:srgbClr val="FFFFFF"/>
+                  <a:srgbClr val="33006F"/>
                 </a:solidFill>
                 <a:latin typeface="Open Sans" panose="020B0606030504020204" pitchFamily="34" charset="0"/>
                 <a:ea typeface="Open Sans" panose="020B0606030504020204" pitchFamily="34" charset="0"/>
@@ -4174,7 +4218,7 @@
             <a:r>
               <a:rPr lang="en-US" sz="2200" b="1" dirty="0">
                 <a:solidFill>
-                  <a:srgbClr val="FFFFFF"/>
+                  <a:srgbClr val="33006F"/>
                 </a:solidFill>
                 <a:latin typeface="Open Sans" panose="020B0606030504020204" pitchFamily="34" charset="0"/>
                 <a:ea typeface="Open Sans" panose="020B0606030504020204" pitchFamily="34" charset="0"/>
@@ -4185,7 +4229,7 @@
             <a:r>
               <a:rPr lang="en-US" sz="2200" dirty="0">
                 <a:solidFill>
-                  <a:srgbClr val="FFFFFF"/>
+                  <a:srgbClr val="33006F"/>
                 </a:solidFill>
                 <a:latin typeface="Open Sans" panose="020B0606030504020204" pitchFamily="34" charset="0"/>
                 <a:ea typeface="Open Sans" panose="020B0606030504020204" pitchFamily="34" charset="0"/>
@@ -4203,18 +4247,29 @@
             <a:r>
               <a:rPr lang="en-US" sz="2200" b="1" dirty="0">
                 <a:solidFill>
+                  <a:srgbClr val="917B4C"/>
+                </a:solidFill>
+                <a:latin typeface="Open Sans" panose="020B0606030504020204" pitchFamily="34" charset="0"/>
+                <a:ea typeface="Open Sans" panose="020B0606030504020204" pitchFamily="34" charset="0"/>
+                <a:cs typeface="Open Sans" panose="020B0606030504020204" pitchFamily="34" charset="0"/>
+              </a:rPr>
+              <a:t>&gt;</a:t>
+            </a:r>
+            <a:r>
+              <a:rPr lang="en-US" sz="2200" b="1" dirty="0">
+                <a:solidFill>
                   <a:schemeClr val="bg1"/>
                 </a:solidFill>
                 <a:latin typeface="Open Sans" panose="020B0606030504020204" pitchFamily="34" charset="0"/>
                 <a:ea typeface="Open Sans" panose="020B0606030504020204" pitchFamily="34" charset="0"/>
                 <a:cs typeface="Open Sans" panose="020B0606030504020204" pitchFamily="34" charset="0"/>
               </a:rPr>
-              <a:t>&gt; </a:t>
+              <a:t> </a:t>
             </a:r>
             <a:r>
               <a:rPr lang="en-US" sz="2200" dirty="0">
                 <a:solidFill>
-                  <a:srgbClr val="FFFFFF"/>
+                  <a:srgbClr val="33006F"/>
                 </a:solidFill>
                 <a:latin typeface="Open Sans" panose="020B0606030504020204" pitchFamily="34" charset="0"/>
                 <a:ea typeface="Open Sans" panose="020B0606030504020204" pitchFamily="34" charset="0"/>
@@ -4225,7 +4280,7 @@
             <a:r>
               <a:rPr lang="en-US" sz="2200" b="1" dirty="0">
                 <a:solidFill>
-                  <a:srgbClr val="FFFFFF"/>
+                  <a:srgbClr val="33006F"/>
                 </a:solidFill>
                 <a:latin typeface="Open Sans" panose="020B0606030504020204" pitchFamily="34" charset="0"/>
                 <a:ea typeface="Open Sans" panose="020B0606030504020204" pitchFamily="34" charset="0"/>
@@ -4236,7 +4291,7 @@
             <a:r>
               <a:rPr lang="en-US" sz="2200" dirty="0">
                 <a:solidFill>
-                  <a:srgbClr val="FFFFFF"/>
+                  <a:srgbClr val="33006F"/>
                 </a:solidFill>
                 <a:latin typeface="Open Sans" panose="020B0606030504020204" pitchFamily="34" charset="0"/>
                 <a:ea typeface="Open Sans" panose="020B0606030504020204" pitchFamily="34" charset="0"/>
@@ -4247,7 +4302,7 @@
             <a:r>
               <a:rPr lang="en-US" sz="2200" b="1" dirty="0">
                 <a:solidFill>
-                  <a:srgbClr val="FFFFFF"/>
+                  <a:srgbClr val="33006F"/>
                 </a:solidFill>
                 <a:latin typeface="Open Sans" panose="020B0606030504020204" pitchFamily="34" charset="0"/>
                 <a:ea typeface="Open Sans" panose="020B0606030504020204" pitchFamily="34" charset="0"/>
@@ -4258,7 +4313,7 @@
             <a:r>
               <a:rPr lang="en-US" sz="2200" dirty="0">
                 <a:solidFill>
-                  <a:srgbClr val="FFFFFF"/>
+                  <a:srgbClr val="33006F"/>
                 </a:solidFill>
                 <a:latin typeface="Open Sans" panose="020B0606030504020204" pitchFamily="34" charset="0"/>
                 <a:ea typeface="Open Sans" panose="020B0606030504020204" pitchFamily="34" charset="0"/>
@@ -4276,7 +4331,7 @@
             <a:r>
               <a:rPr lang="en-US" sz="2200" b="1" dirty="0">
                 <a:solidFill>
-                  <a:schemeClr val="bg1"/>
+                  <a:srgbClr val="917B4C"/>
                 </a:solidFill>
                 <a:latin typeface="Open Sans" panose="020B0606030504020204" pitchFamily="34" charset="0"/>
                 <a:ea typeface="Open Sans" panose="020B0606030504020204" pitchFamily="34" charset="0"/>
@@ -4293,12 +4348,23 @@
                 <a:ea typeface="Open Sans" panose="020B0606030504020204" pitchFamily="34" charset="0"/>
                 <a:cs typeface="Open Sans" panose="020B0606030504020204" pitchFamily="34" charset="0"/>
               </a:rPr>
-              <a:t> Utilized </a:t>
+              <a:t> </a:t>
+            </a:r>
+            <a:r>
+              <a:rPr lang="en-US" sz="2200" dirty="0">
+                <a:solidFill>
+                  <a:srgbClr val="33006F"/>
+                </a:solidFill>
+                <a:latin typeface="Open Sans" panose="020B0606030504020204" pitchFamily="34" charset="0"/>
+                <a:ea typeface="Open Sans" panose="020B0606030504020204" pitchFamily="34" charset="0"/>
+                <a:cs typeface="Open Sans" panose="020B0606030504020204" pitchFamily="34" charset="0"/>
+              </a:rPr>
+              <a:t>Utilized </a:t>
             </a:r>
             <a:r>
               <a:rPr lang="en-US" sz="2200" b="1" dirty="0">
                 <a:solidFill>
-                  <a:srgbClr val="FFFFFF"/>
+                  <a:srgbClr val="33006F"/>
                 </a:solidFill>
                 <a:latin typeface="Open Sans" panose="020B0606030504020204" pitchFamily="34" charset="0"/>
                 <a:ea typeface="Open Sans" panose="020B0606030504020204" pitchFamily="34" charset="0"/>
@@ -4309,7 +4375,7 @@
             <a:r>
               <a:rPr lang="en-US" sz="2200" dirty="0">
                 <a:solidFill>
-                  <a:srgbClr val="FFFFFF"/>
+                  <a:srgbClr val="33006F"/>
                 </a:solidFill>
                 <a:latin typeface="Open Sans" panose="020B0606030504020204" pitchFamily="34" charset="0"/>
                 <a:ea typeface="Open Sans" panose="020B0606030504020204" pitchFamily="34" charset="0"/>
@@ -4320,7 +4386,7 @@
             <a:r>
               <a:rPr lang="en-US" sz="2200" b="1" dirty="0">
                 <a:solidFill>
-                  <a:srgbClr val="FFFFFF"/>
+                  <a:srgbClr val="33006F"/>
                 </a:solidFill>
                 <a:latin typeface="Open Sans" panose="020B0606030504020204" pitchFamily="34" charset="0"/>
                 <a:ea typeface="Open Sans" panose="020B0606030504020204" pitchFamily="34" charset="0"/>
@@ -4331,7 +4397,7 @@
             <a:r>
               <a:rPr lang="en-US" sz="2200" dirty="0">
                 <a:solidFill>
-                  <a:srgbClr val="FFFFFF"/>
+                  <a:srgbClr val="33006F"/>
                 </a:solidFill>
                 <a:latin typeface="Open Sans" panose="020B0606030504020204" pitchFamily="34" charset="0"/>
                 <a:ea typeface="Open Sans" panose="020B0606030504020204" pitchFamily="34" charset="0"/>
@@ -4342,7 +4408,7 @@
             <a:r>
               <a:rPr lang="en-US" sz="2200" b="1" dirty="0">
                 <a:solidFill>
-                  <a:srgbClr val="FFFFFF"/>
+                  <a:srgbClr val="33006F"/>
                 </a:solidFill>
                 <a:latin typeface="Open Sans" panose="020B0606030504020204" pitchFamily="34" charset="0"/>
                 <a:ea typeface="Open Sans" panose="020B0606030504020204" pitchFamily="34" charset="0"/>
@@ -4353,7 +4419,7 @@
             <a:r>
               <a:rPr lang="en-US" sz="2200" dirty="0">
                 <a:solidFill>
-                  <a:srgbClr val="FFFFFF"/>
+                  <a:srgbClr val="33006F"/>
                 </a:solidFill>
                 <a:latin typeface="Open Sans" panose="020B0606030504020204" pitchFamily="34" charset="0"/>
                 <a:ea typeface="Open Sans" panose="020B0606030504020204" pitchFamily="34" charset="0"/>
@@ -4364,7 +4430,7 @@
             <a:r>
               <a:rPr lang="en-US" sz="2200" b="1" dirty="0">
                 <a:solidFill>
-                  <a:srgbClr val="FFFFFF"/>
+                  <a:srgbClr val="33006F"/>
                 </a:solidFill>
                 <a:latin typeface="Open Sans" panose="020B0606030504020204" pitchFamily="34" charset="0"/>
                 <a:ea typeface="Open Sans" panose="020B0606030504020204" pitchFamily="34" charset="0"/>
@@ -4374,7 +4440,7 @@
             </a:r>
             <a:endParaRPr lang="en-US" sz="2200" dirty="0">
               <a:solidFill>
-                <a:srgbClr val="FFFFFF"/>
+                <a:srgbClr val="33006F"/>
               </a:solidFill>
               <a:latin typeface="Open Sans" panose="020B0606030504020204" pitchFamily="34" charset="0"/>
               <a:ea typeface="Open Sans" panose="020B0606030504020204" pitchFamily="34" charset="0"/>

</xml_diff>